<commit_message>
local commit for merging with remote branch
</commit_message>
<xml_diff>
--- a/documents/UMLx_Introduction_toolv1.1.pptx
+++ b/documents/UMLx_Introduction_toolv1.1.pptx
@@ -210,7 +210,7 @@
           <a:p>
             <a:fld id="{1AA9BCBD-F247-43A9-8490-88C651420C90}" type="datetimeFigureOut">
               <a:rPr lang="en-US" smtClean="0"/>
-              <a:t>10/27/2018</a:t>
+              <a:t>10/31/2018</a:t>
             </a:fld>
             <a:endParaRPr lang="en-US"/>
           </a:p>
@@ -690,7 +690,7 @@
           <a:p>
             <a:fld id="{9D00D9CD-F0CF-44B7-B550-D9BAB2022B28}" type="datetimeFigureOut">
               <a:rPr lang="en-US" smtClean="0"/>
-              <a:t>10/27/2018</a:t>
+              <a:t>10/31/2018</a:t>
             </a:fld>
             <a:endParaRPr lang="en-US"/>
           </a:p>
@@ -858,7 +858,7 @@
           <a:p>
             <a:fld id="{9D00D9CD-F0CF-44B7-B550-D9BAB2022B28}" type="datetimeFigureOut">
               <a:rPr lang="en-US" smtClean="0"/>
-              <a:t>10/27/2018</a:t>
+              <a:t>10/31/2018</a:t>
             </a:fld>
             <a:endParaRPr lang="en-US"/>
           </a:p>
@@ -1036,7 +1036,7 @@
           <a:p>
             <a:fld id="{9D00D9CD-F0CF-44B7-B550-D9BAB2022B28}" type="datetimeFigureOut">
               <a:rPr lang="en-US" smtClean="0"/>
-              <a:t>10/27/2018</a:t>
+              <a:t>10/31/2018</a:t>
             </a:fld>
             <a:endParaRPr lang="en-US"/>
           </a:p>
@@ -1204,7 +1204,7 @@
           <a:p>
             <a:fld id="{9D00D9CD-F0CF-44B7-B550-D9BAB2022B28}" type="datetimeFigureOut">
               <a:rPr lang="en-US" smtClean="0"/>
-              <a:t>10/27/2018</a:t>
+              <a:t>10/31/2018</a:t>
             </a:fld>
             <a:endParaRPr lang="en-US"/>
           </a:p>
@@ -1449,7 +1449,7 @@
           <a:p>
             <a:fld id="{9D00D9CD-F0CF-44B7-B550-D9BAB2022B28}" type="datetimeFigureOut">
               <a:rPr lang="en-US" smtClean="0"/>
-              <a:t>10/27/2018</a:t>
+              <a:t>10/31/2018</a:t>
             </a:fld>
             <a:endParaRPr lang="en-US"/>
           </a:p>
@@ -1678,7 +1678,7 @@
           <a:p>
             <a:fld id="{9D00D9CD-F0CF-44B7-B550-D9BAB2022B28}" type="datetimeFigureOut">
               <a:rPr lang="en-US" smtClean="0"/>
-              <a:t>10/27/2018</a:t>
+              <a:t>10/31/2018</a:t>
             </a:fld>
             <a:endParaRPr lang="en-US"/>
           </a:p>
@@ -2042,7 +2042,7 @@
           <a:p>
             <a:fld id="{9D00D9CD-F0CF-44B7-B550-D9BAB2022B28}" type="datetimeFigureOut">
               <a:rPr lang="en-US" smtClean="0"/>
-              <a:t>10/27/2018</a:t>
+              <a:t>10/31/2018</a:t>
             </a:fld>
             <a:endParaRPr lang="en-US"/>
           </a:p>
@@ -2159,7 +2159,7 @@
           <a:p>
             <a:fld id="{9D00D9CD-F0CF-44B7-B550-D9BAB2022B28}" type="datetimeFigureOut">
               <a:rPr lang="en-US" smtClean="0"/>
-              <a:t>10/27/2018</a:t>
+              <a:t>10/31/2018</a:t>
             </a:fld>
             <a:endParaRPr lang="en-US"/>
           </a:p>
@@ -2254,7 +2254,7 @@
           <a:p>
             <a:fld id="{9D00D9CD-F0CF-44B7-B550-D9BAB2022B28}" type="datetimeFigureOut">
               <a:rPr lang="en-US" smtClean="0"/>
-              <a:t>10/27/2018</a:t>
+              <a:t>10/31/2018</a:t>
             </a:fld>
             <a:endParaRPr lang="en-US"/>
           </a:p>
@@ -2529,7 +2529,7 @@
           <a:p>
             <a:fld id="{9D00D9CD-F0CF-44B7-B550-D9BAB2022B28}" type="datetimeFigureOut">
               <a:rPr lang="en-US" smtClean="0"/>
-              <a:t>10/27/2018</a:t>
+              <a:t>10/31/2018</a:t>
             </a:fld>
             <a:endParaRPr lang="en-US"/>
           </a:p>
@@ -2781,7 +2781,7 @@
           <a:p>
             <a:fld id="{9D00D9CD-F0CF-44B7-B550-D9BAB2022B28}" type="datetimeFigureOut">
               <a:rPr lang="en-US" smtClean="0"/>
-              <a:t>10/27/2018</a:t>
+              <a:t>10/31/2018</a:t>
             </a:fld>
             <a:endParaRPr lang="en-US"/>
           </a:p>
@@ -2992,7 +2992,7 @@
           <a:p>
             <a:fld id="{9D00D9CD-F0CF-44B7-B550-D9BAB2022B28}" type="datetimeFigureOut">
               <a:rPr lang="en-US" smtClean="0"/>
-              <a:t>10/27/2018</a:t>
+              <a:t>10/31/2018</a:t>
             </a:fld>
             <a:endParaRPr lang="en-US"/>
           </a:p>
@@ -4598,7 +4598,7 @@
             <a:pPr lvl="1"/>
             <a:r>
               <a:rPr lang="en-US"/>
-              <a:t>Productivity Measuing.</a:t>
+              <a:t>Productivity measurement</a:t>
             </a:r>
           </a:p>
         </p:txBody>

</xml_diff>